<commit_message>
2-3 corrections dans le texte
</commit_message>
<xml_diff>
--- a/PDS-INFO-1-G5.pptx
+++ b/PDS-INFO-1-G5.pptx
@@ -159,6 +159,43 @@
 </p:presentation>
 </file>
 
+<file path=ppt/changesInfos/changesInfo1.xml><?xml version="1.0" encoding="utf-8"?>
+<pc:chgInfo xmlns:a="http://schemas.openxmlformats.org/drawingml/2006/main" xmlns:r="http://schemas.openxmlformats.org/officeDocument/2006/relationships" xmlns:ac="http://schemas.microsoft.com/office/drawing/2013/main/command" xmlns:pc="http://schemas.microsoft.com/office/powerpoint/2013/main/command">
+  <pc:docChgLst>
+    <pc:chgData name="Brice.Petit@ulb.ac.be" userId="471340c5-ea36-4afb-85d4-5000669cca5d" providerId="ADAL" clId="{5B1F39B6-78EC-4F5F-A83C-91AFB0379C22}"/>
+    <pc:docChg chg="undo custSel modSld">
+      <pc:chgData name="Brice.Petit@ulb.ac.be" userId="471340c5-ea36-4afb-85d4-5000669cca5d" providerId="ADAL" clId="{5B1F39B6-78EC-4F5F-A83C-91AFB0379C22}" dt="2020-04-19T09:17:41.241" v="152" actId="20577"/>
+      <pc:docMkLst>
+        <pc:docMk/>
+      </pc:docMkLst>
+      <pc:sldChg chg="modSp mod">
+        <pc:chgData name="Brice.Petit@ulb.ac.be" userId="471340c5-ea36-4afb-85d4-5000669cca5d" providerId="ADAL" clId="{5B1F39B6-78EC-4F5F-A83C-91AFB0379C22}" dt="2020-04-19T09:17:41.241" v="152" actId="20577"/>
+        <pc:sldMkLst>
+          <pc:docMk/>
+          <pc:sldMk cId="0" sldId="256"/>
+        </pc:sldMkLst>
+        <pc:spChg chg="mod">
+          <ac:chgData name="Brice.Petit@ulb.ac.be" userId="471340c5-ea36-4afb-85d4-5000669cca5d" providerId="ADAL" clId="{5B1F39B6-78EC-4F5F-A83C-91AFB0379C22}" dt="2020-04-19T09:00:14.155" v="3" actId="20577"/>
+          <ac:spMkLst>
+            <pc:docMk/>
+            <pc:sldMk cId="0" sldId="256"/>
+            <ac:spMk id="34" creationId="{00000000-0000-0000-0000-000000000000}"/>
+          </ac:spMkLst>
+        </pc:spChg>
+        <pc:spChg chg="mod">
+          <ac:chgData name="Brice.Petit@ulb.ac.be" userId="471340c5-ea36-4afb-85d4-5000669cca5d" providerId="ADAL" clId="{5B1F39B6-78EC-4F5F-A83C-91AFB0379C22}" dt="2020-04-19T09:17:41.241" v="152" actId="20577"/>
+          <ac:spMkLst>
+            <pc:docMk/>
+            <pc:sldMk cId="0" sldId="256"/>
+            <ac:spMk id="36" creationId="{EA82CD33-333B-43A0-8E4F-8158ED4AC571}"/>
+          </ac:spMkLst>
+        </pc:spChg>
+      </pc:sldChg>
+    </pc:docChg>
+  </pc:docChgLst>
+</pc:chgInfo>
+</file>
+
 <file path=ppt/handoutMasters/handoutMaster1.xml><?xml version="1.0" encoding="utf-8"?>
 <p:handoutMaster xmlns:a="http://schemas.openxmlformats.org/drawingml/2006/main" xmlns:r="http://schemas.openxmlformats.org/officeDocument/2006/relationships" xmlns:p="http://schemas.openxmlformats.org/presentationml/2006/main">
   <p:cSld>
@@ -260,7 +297,7 @@
               <a:pPr>
                 <a:defRPr/>
               </a:pPr>
-              <a:t>18-04-20</a:t>
+              <a:t>19-04-20</a:t>
             </a:fld>
             <a:endParaRPr lang="fr-BE"/>
           </a:p>
@@ -464,7 +501,7 @@
               <a:pPr>
                 <a:defRPr/>
               </a:pPr>
-              <a:t>18-04-20</a:t>
+              <a:t>19-04-20</a:t>
             </a:fld>
             <a:endParaRPr lang="fr-BE"/>
           </a:p>
@@ -5247,7 +5284,7 @@
             <a:pPr algn="just"/>
             <a:r>
               <a:rPr lang="fr-BE" sz="4400" dirty="0"/>
-              <a:t>	Le but du projet est l’automatisation du tri de déchets via des méthodes informatiques, s’appuyant sur l’analyse d’images. Un ensemble de techniques d’apprentissage automatique, permettent de créer des modèles de prédiction. Ces derniers permettent de classer les images en différentes catégories.</a:t>
+              <a:t>	Le but du projet est l’automatisation du tri de déchets via des méthodes informatiques, s’appuyant sur l’analyse d’images. Un ensemble de techniques d’apprentissage automatique permettent de créer des modèles de prédiction. Ces derniers permettent de classer les images en différentes catégories.</a:t>
             </a:r>
           </a:p>
         </p:txBody>
@@ -5319,15 +5356,15 @@
             <a:pPr algn="just"/>
             <a:r>
               <a:rPr lang="fr-BE" sz="4400" dirty="0"/>
-              <a:t>	Un modèle fonctionnel a été importé sur un </a:t>
-            </a:r>
-            <a:r>
-              <a:rPr lang="fr-BE" sz="4400" dirty="0" err="1"/>
-              <a:t>raspberry</a:t>
+              <a:t>	Un modèle fonctionnel a été importé sur un Raspberry PI 4 (au centre du schéma, </a:t>
+            </a:r>
+            <a:r>
+              <a:rPr lang="fr-BE" sz="4400"/>
+              <a:t>un nano-ordinateur), </a:t>
             </a:r>
             <a:r>
               <a:rPr lang="fr-BE" sz="4400" dirty="0"/>
-              <a:t> pi 4 (au centre du schéma), liée à un ensemble de périphériques :</a:t>
+              <a:t>liée à un ensemble de périphériques :</a:t>
             </a:r>
           </a:p>
           <a:p>
@@ -5348,7 +5385,14 @@
             <a:pPr algn="just"/>
             <a:r>
               <a:rPr lang="fr-BE" sz="4400" dirty="0"/>
-              <a:t>	- Un contrôleur de moteurs attachés aux 			  poubelles.</a:t>
+              <a:t>	- Les moteurs sont attachés aux poubelles.</a:t>
+            </a:r>
+          </a:p>
+          <a:p>
+            <a:pPr algn="just"/>
+            <a:r>
+              <a:rPr lang="fr-BE" sz="4400" dirty="0"/>
+              <a:t>	- Les moteurs sont reliés à un contrôleur.</a:t>
             </a:r>
           </a:p>
         </p:txBody>

</xml_diff>

<commit_message>
Modification de la fiche
version finale
</commit_message>
<xml_diff>
--- a/PDS-INFO-1-G5.pptx
+++ b/PDS-INFO-1-G5.pptx
@@ -159,17 +159,25 @@
 </p:presentation>
 </file>
 
+<file path=ppt/revisionInfo.xml><?xml version="1.0" encoding="utf-8"?>
+<p1510:revInfo xmlns:a="http://schemas.openxmlformats.org/drawingml/2006/main" xmlns:r="http://schemas.openxmlformats.org/officeDocument/2006/relationships" xmlns:p1510="http://schemas.microsoft.com/office/powerpoint/2015/10/main">
+  <p1510:revLst>
+    <p1510:client id="{5B1F39B6-78EC-4F5F-A83C-91AFB0379C22}" v="5" dt="2020-04-21T07:32:29.857"/>
+  </p1510:revLst>
+</p1510:revInfo>
+</file>
+
 <file path=ppt/changesInfos/changesInfo1.xml><?xml version="1.0" encoding="utf-8"?>
 <pc:chgInfo xmlns:a="http://schemas.openxmlformats.org/drawingml/2006/main" xmlns:r="http://schemas.openxmlformats.org/officeDocument/2006/relationships" xmlns:ac="http://schemas.microsoft.com/office/drawing/2013/main/command" xmlns:pc="http://schemas.microsoft.com/office/powerpoint/2013/main/command">
   <pc:docChgLst>
     <pc:chgData name="Brice.Petit@ulb.ac.be" userId="471340c5-ea36-4afb-85d4-5000669cca5d" providerId="ADAL" clId="{5B1F39B6-78EC-4F5F-A83C-91AFB0379C22}"/>
     <pc:docChg chg="undo custSel modSld">
-      <pc:chgData name="Brice.Petit@ulb.ac.be" userId="471340c5-ea36-4afb-85d4-5000669cca5d" providerId="ADAL" clId="{5B1F39B6-78EC-4F5F-A83C-91AFB0379C22}" dt="2020-04-19T09:17:41.241" v="152" actId="20577"/>
+      <pc:chgData name="Brice.Petit@ulb.ac.be" userId="471340c5-ea36-4afb-85d4-5000669cca5d" providerId="ADAL" clId="{5B1F39B6-78EC-4F5F-A83C-91AFB0379C22}" dt="2020-04-21T07:32:30.996" v="155" actId="20577"/>
       <pc:docMkLst>
         <pc:docMk/>
       </pc:docMkLst>
       <pc:sldChg chg="modSp mod">
-        <pc:chgData name="Brice.Petit@ulb.ac.be" userId="471340c5-ea36-4afb-85d4-5000669cca5d" providerId="ADAL" clId="{5B1F39B6-78EC-4F5F-A83C-91AFB0379C22}" dt="2020-04-19T09:17:41.241" v="152" actId="20577"/>
+        <pc:chgData name="Brice.Petit@ulb.ac.be" userId="471340c5-ea36-4afb-85d4-5000669cca5d" providerId="ADAL" clId="{5B1F39B6-78EC-4F5F-A83C-91AFB0379C22}" dt="2020-04-21T07:32:30.996" v="155" actId="20577"/>
         <pc:sldMkLst>
           <pc:docMk/>
           <pc:sldMk cId="0" sldId="256"/>
@@ -188,6 +196,14 @@
             <pc:docMk/>
             <pc:sldMk cId="0" sldId="256"/>
             <ac:spMk id="36" creationId="{EA82CD33-333B-43A0-8E4F-8158ED4AC571}"/>
+          </ac:spMkLst>
+        </pc:spChg>
+        <pc:spChg chg="mod">
+          <ac:chgData name="Brice.Petit@ulb.ac.be" userId="471340c5-ea36-4afb-85d4-5000669cca5d" providerId="ADAL" clId="{5B1F39B6-78EC-4F5F-A83C-91AFB0379C22}" dt="2020-04-21T07:32:30.996" v="155" actId="20577"/>
+          <ac:spMkLst>
+            <pc:docMk/>
+            <pc:sldMk cId="0" sldId="256"/>
+            <ac:spMk id="2052" creationId="{00000000-0000-0000-0000-000000000000}"/>
           </ac:spMkLst>
         </pc:spChg>
       </pc:sldChg>
@@ -297,7 +313,7 @@
               <a:pPr>
                 <a:defRPr/>
               </a:pPr>
-              <a:t>19-04-20</a:t>
+              <a:t>21-04-20</a:t>
             </a:fld>
             <a:endParaRPr lang="fr-BE"/>
           </a:p>
@@ -501,7 +517,7 @@
               <a:pPr>
                 <a:defRPr/>
               </a:pPr>
-              <a:t>19-04-20</a:t>
+              <a:t>21-04-20</a:t>
             </a:fld>
             <a:endParaRPr lang="fr-BE"/>
           </a:p>
@@ -4618,7 +4634,16 @@
                 </a:solidFill>
                 <a:latin typeface="+mj-lt"/>
               </a:rPr>
-              <a:t>Amir FALLAHI, Brice PETIT, Dumitru NEGRU, Hugo CALLEBAUT, Maxime HAUWAERT et Yahya BAKKALI</a:t>
+              <a:t>Yahya BAKKALI, Hugo CALLEBAUT, Amir FALLAHI, Maxime HAUWAERT, Dumitru NEGRU et </a:t>
+            </a:r>
+            <a:r>
+              <a:rPr lang="fr-FR" altLang="fr-FR" sz="3600" b="1">
+                <a:solidFill>
+                  <a:srgbClr val="CC0000"/>
+                </a:solidFill>
+                <a:latin typeface="+mj-lt"/>
+              </a:rPr>
+              <a:t>Brice PETIT</a:t>
             </a:r>
             <a:endParaRPr lang="fr-FR" altLang="fr-FR" sz="7200" b="1" dirty="0">
               <a:solidFill>

</xml_diff>